<commit_message>
added some XS sizes
</commit_message>
<xml_diff>
--- a/Size-Labels.pptx
+++ b/Size-Labels.pptx
@@ -113,6 +113,10 @@
 </p:presentation>
 </file>
 
+<file path=ppt/revisionInfo.xml><?xml version="1.0" encoding="utf-8"?>
+<p1510:revInfo xmlns:a="http://schemas.openxmlformats.org/drawingml/2006/main" xmlns:r="http://schemas.openxmlformats.org/officeDocument/2006/relationships" xmlns:p1510="http://schemas.microsoft.com/office/powerpoint/2015/10/main"/>
+</file>
+
 <file path=ppt/slideLayouts/slideLayout1.xml><?xml version="1.0" encoding="utf-8"?>
 <p:sldLayout xmlns:a="http://schemas.openxmlformats.org/drawingml/2006/main" xmlns:r="http://schemas.openxmlformats.org/officeDocument/2006/relationships" xmlns:p="http://schemas.openxmlformats.org/presentationml/2006/main" type="title" preserve="1">
   <p:cSld name="Title Slide">
@@ -242,7 +246,7 @@
           <a:p>
             <a:fld id="{E70B8B09-3AEF-4C18-908E-7E9E2C91D480}" type="datetimeFigureOut">
               <a:rPr lang="en-US" smtClean="0"/>
-              <a:t>11/8/2016</a:t>
+              <a:t>1/31/2018</a:t>
             </a:fld>
             <a:endParaRPr lang="en-US"/>
           </a:p>
@@ -410,7 +414,7 @@
           <a:p>
             <a:fld id="{E70B8B09-3AEF-4C18-908E-7E9E2C91D480}" type="datetimeFigureOut">
               <a:rPr lang="en-US" smtClean="0"/>
-              <a:t>11/8/2016</a:t>
+              <a:t>1/31/2018</a:t>
             </a:fld>
             <a:endParaRPr lang="en-US"/>
           </a:p>
@@ -588,7 +592,7 @@
           <a:p>
             <a:fld id="{E70B8B09-3AEF-4C18-908E-7E9E2C91D480}" type="datetimeFigureOut">
               <a:rPr lang="en-US" smtClean="0"/>
-              <a:t>11/8/2016</a:t>
+              <a:t>1/31/2018</a:t>
             </a:fld>
             <a:endParaRPr lang="en-US"/>
           </a:p>
@@ -756,7 +760,7 @@
           <a:p>
             <a:fld id="{E70B8B09-3AEF-4C18-908E-7E9E2C91D480}" type="datetimeFigureOut">
               <a:rPr lang="en-US" smtClean="0"/>
-              <a:t>11/8/2016</a:t>
+              <a:t>1/31/2018</a:t>
             </a:fld>
             <a:endParaRPr lang="en-US"/>
           </a:p>
@@ -1001,7 +1005,7 @@
           <a:p>
             <a:fld id="{E70B8B09-3AEF-4C18-908E-7E9E2C91D480}" type="datetimeFigureOut">
               <a:rPr lang="en-US" smtClean="0"/>
-              <a:t>11/8/2016</a:t>
+              <a:t>1/31/2018</a:t>
             </a:fld>
             <a:endParaRPr lang="en-US"/>
           </a:p>
@@ -1230,7 +1234,7 @@
           <a:p>
             <a:fld id="{E70B8B09-3AEF-4C18-908E-7E9E2C91D480}" type="datetimeFigureOut">
               <a:rPr lang="en-US" smtClean="0"/>
-              <a:t>11/8/2016</a:t>
+              <a:t>1/31/2018</a:t>
             </a:fld>
             <a:endParaRPr lang="en-US"/>
           </a:p>
@@ -1594,7 +1598,7 @@
           <a:p>
             <a:fld id="{E70B8B09-3AEF-4C18-908E-7E9E2C91D480}" type="datetimeFigureOut">
               <a:rPr lang="en-US" smtClean="0"/>
-              <a:t>11/8/2016</a:t>
+              <a:t>1/31/2018</a:t>
             </a:fld>
             <a:endParaRPr lang="en-US"/>
           </a:p>
@@ -1711,7 +1715,7 @@
           <a:p>
             <a:fld id="{E70B8B09-3AEF-4C18-908E-7E9E2C91D480}" type="datetimeFigureOut">
               <a:rPr lang="en-US" smtClean="0"/>
-              <a:t>11/8/2016</a:t>
+              <a:t>1/31/2018</a:t>
             </a:fld>
             <a:endParaRPr lang="en-US"/>
           </a:p>
@@ -1806,7 +1810,7 @@
           <a:p>
             <a:fld id="{E70B8B09-3AEF-4C18-908E-7E9E2C91D480}" type="datetimeFigureOut">
               <a:rPr lang="en-US" smtClean="0"/>
-              <a:t>11/8/2016</a:t>
+              <a:t>1/31/2018</a:t>
             </a:fld>
             <a:endParaRPr lang="en-US"/>
           </a:p>
@@ -2081,7 +2085,7 @@
           <a:p>
             <a:fld id="{E70B8B09-3AEF-4C18-908E-7E9E2C91D480}" type="datetimeFigureOut">
               <a:rPr lang="en-US" smtClean="0"/>
-              <a:t>11/8/2016</a:t>
+              <a:t>1/31/2018</a:t>
             </a:fld>
             <a:endParaRPr lang="en-US"/>
           </a:p>
@@ -2333,7 +2337,7 @@
           <a:p>
             <a:fld id="{E70B8B09-3AEF-4C18-908E-7E9E2C91D480}" type="datetimeFigureOut">
               <a:rPr lang="en-US" smtClean="0"/>
-              <a:t>11/8/2016</a:t>
+              <a:t>1/31/2018</a:t>
             </a:fld>
             <a:endParaRPr lang="en-US"/>
           </a:p>
@@ -2544,7 +2548,7 @@
           <a:p>
             <a:fld id="{E70B8B09-3AEF-4C18-908E-7E9E2C91D480}" type="datetimeFigureOut">
               <a:rPr lang="en-US" smtClean="0"/>
-              <a:t>11/8/2016</a:t>
+              <a:t>1/31/2018</a:t>
             </a:fld>
             <a:endParaRPr lang="en-US"/>
           </a:p>
@@ -3181,7 +3185,7 @@
                     </a:schemeClr>
                   </a:solidFill>
                 </a:rPr>
-                <a:t>12</a:t>
+                <a:t>.5</a:t>
               </a:r>
             </a:p>
           </p:txBody>

</xml_diff>